<commit_message>
Added a future development section
</commit_message>
<xml_diff>
--- a/project1_presentation.pptx
+++ b/project1_presentation.pptx
@@ -9,7 +9,8 @@
     <p:sldId id="257" r:id="rId3"/>
     <p:sldId id="258" r:id="rId4"/>
     <p:sldId id="259" r:id="rId5"/>
-    <p:sldId id="260" r:id="rId6"/>
+    <p:sldId id="261" r:id="rId6"/>
+    <p:sldId id="260" r:id="rId7"/>
   </p:sldIdLst>
   <p:sldSz cx="12192000" cy="6858000"/>
   <p:notesSz cx="6858000" cy="9144000"/>
@@ -3720,6 +3721,155 @@
           <p:cNvPr id="2" name="Title 1">
             <a:extLst>
               <a:ext uri="{FF2B5EF4-FFF2-40B4-BE49-F238E27FC236}">
+                <a16:creationId xmlns:a16="http://schemas.microsoft.com/office/drawing/2014/main" id="{46E88649-E3B2-4B59-9E0E-79F7227B5ED6}"/>
+              </a:ext>
+            </a:extLst>
+          </p:cNvPr>
+          <p:cNvSpPr>
+            <a:spLocks noGrp="1"/>
+          </p:cNvSpPr>
+          <p:nvPr>
+            <p:ph type="title"/>
+          </p:nvPr>
+        </p:nvSpPr>
+        <p:spPr/>
+        <p:txBody>
+          <a:bodyPr/>
+          <a:lstStyle/>
+          <a:p>
+            <a:r>
+              <a:rPr lang="en-US" b="1" dirty="0"/>
+              <a:t>Future Development</a:t>
+            </a:r>
+          </a:p>
+        </p:txBody>
+      </p:sp>
+      <p:sp>
+        <p:nvSpPr>
+          <p:cNvPr id="3" name="Content Placeholder 2">
+            <a:extLst>
+              <a:ext uri="{FF2B5EF4-FFF2-40B4-BE49-F238E27FC236}">
+                <a16:creationId xmlns:a16="http://schemas.microsoft.com/office/drawing/2014/main" id="{2BE78393-6136-4930-934D-7D54686CE1B4}"/>
+              </a:ext>
+            </a:extLst>
+          </p:cNvPr>
+          <p:cNvSpPr>
+            <a:spLocks noGrp="1"/>
+          </p:cNvSpPr>
+          <p:nvPr>
+            <p:ph idx="1"/>
+          </p:nvPr>
+        </p:nvSpPr>
+        <p:spPr/>
+        <p:txBody>
+          <a:bodyPr/>
+          <a:lstStyle/>
+          <a:p>
+            <a:r>
+              <a:rPr lang="en-US" b="0" i="0" dirty="0">
+                <a:effectLst/>
+                <a:latin typeface="Slack-Lato"/>
+              </a:rPr>
+              <a:t>Would like to incorporate advance battle mechanics</a:t>
+            </a:r>
+          </a:p>
+          <a:p>
+            <a:r>
+              <a:rPr lang="en-US" dirty="0">
+                <a:latin typeface="Slack-Lato"/>
+              </a:rPr>
+              <a:t>A</a:t>
+            </a:r>
+            <a:r>
+              <a:rPr lang="en-US" b="0" i="0" dirty="0">
+                <a:effectLst/>
+                <a:latin typeface="Slack-Lato"/>
+              </a:rPr>
+              <a:t>n extended story</a:t>
+            </a:r>
+          </a:p>
+          <a:p>
+            <a:r>
+              <a:rPr lang="en-US" dirty="0">
+                <a:latin typeface="Slack-Lato"/>
+              </a:rPr>
+              <a:t>S</a:t>
+            </a:r>
+            <a:r>
+              <a:rPr lang="en-US" b="0" i="0" dirty="0">
+                <a:effectLst/>
+                <a:latin typeface="Slack-Lato"/>
+              </a:rPr>
+              <a:t>ound effects and music</a:t>
+            </a:r>
+          </a:p>
+          <a:p>
+            <a:r>
+              <a:rPr lang="en-US" b="0" i="0" dirty="0">
+                <a:effectLst/>
+                <a:latin typeface="Slack-Lato"/>
+              </a:rPr>
+              <a:t>Improved scoring</a:t>
+            </a:r>
+          </a:p>
+          <a:p>
+            <a:r>
+              <a:rPr lang="en-US" dirty="0">
+                <a:latin typeface="Slack-Lato"/>
+              </a:rPr>
+              <a:t>General style and </a:t>
+            </a:r>
+            <a:r>
+              <a:rPr lang="en-US">
+                <a:latin typeface="Slack-Lato"/>
+              </a:rPr>
+              <a:t>aesthetic changes</a:t>
+            </a:r>
+            <a:endParaRPr lang="en-US" b="0" i="0" dirty="0">
+              <a:effectLst/>
+              <a:latin typeface="Slack-Lato"/>
+            </a:endParaRPr>
+          </a:p>
+          <a:p>
+            <a:endParaRPr lang="en-US" dirty="0"/>
+          </a:p>
+        </p:txBody>
+      </p:sp>
+    </p:spTree>
+    <p:extLst>
+      <p:ext uri="{BB962C8B-B14F-4D97-AF65-F5344CB8AC3E}">
+        <p14:creationId xmlns:p14="http://schemas.microsoft.com/office/powerpoint/2010/main" val="1104817776"/>
+      </p:ext>
+    </p:extLst>
+  </p:cSld>
+  <p:clrMapOvr>
+    <a:masterClrMapping/>
+  </p:clrMapOvr>
+</p:sld>
+</file>
+
+<file path=ppt/slides/slide6.xml><?xml version="1.0" encoding="utf-8"?>
+<p:sld xmlns:a="http://schemas.openxmlformats.org/drawingml/2006/main" xmlns:r="http://schemas.openxmlformats.org/officeDocument/2006/relationships" xmlns:p="http://schemas.openxmlformats.org/presentationml/2006/main">
+  <p:cSld>
+    <p:spTree>
+      <p:nvGrpSpPr>
+        <p:cNvPr id="1" name=""/>
+        <p:cNvGrpSpPr/>
+        <p:nvPr/>
+      </p:nvGrpSpPr>
+      <p:grpSpPr>
+        <a:xfrm>
+          <a:off x="0" y="0"/>
+          <a:ext cx="0" cy="0"/>
+          <a:chOff x="0" y="0"/>
+          <a:chExt cx="0" cy="0"/>
+        </a:xfrm>
+      </p:grpSpPr>
+      <p:sp>
+        <p:nvSpPr>
+          <p:cNvPr id="2" name="Title 1">
+            <a:extLst>
+              <a:ext uri="{FF2B5EF4-FFF2-40B4-BE49-F238E27FC236}">
                 <a16:creationId xmlns:a16="http://schemas.microsoft.com/office/drawing/2014/main" id="{AD6C86B3-56A5-41D0-A341-4719B5020017}"/>
               </a:ext>
             </a:extLst>

</xml_diff>

<commit_message>
made edits and additions to powerpoint
</commit_message>
<xml_diff>
--- a/project1_presentation.pptx
+++ b/project1_presentation.pptx
@@ -8,9 +8,10 @@
     <p:sldId id="256" r:id="rId2"/>
     <p:sldId id="257" r:id="rId3"/>
     <p:sldId id="258" r:id="rId4"/>
-    <p:sldId id="259" r:id="rId5"/>
-    <p:sldId id="261" r:id="rId6"/>
-    <p:sldId id="260" r:id="rId7"/>
+    <p:sldId id="262" r:id="rId5"/>
+    <p:sldId id="259" r:id="rId6"/>
+    <p:sldId id="261" r:id="rId7"/>
+    <p:sldId id="260" r:id="rId8"/>
   </p:sldIdLst>
   <p:sldSz cx="12192000" cy="6858000"/>
   <p:notesSz cx="6858000" cy="9144000"/>
@@ -3580,7 +3581,7 @@
                 <a:effectLst/>
                 <a:latin typeface="Slack-Lato"/>
               </a:rPr>
-              <a:t>As a gaming person living through a pandemic, I want an application that takes me through a day in the life and the challenges that might arise along the way. I want to have fun in leu of the pandemic, I want to learn more about the pandemic, I want an element of escapism that makes light of the pandemic.</a:t>
+              <a:t>AS a gaming person living through a pandemic, I WANT an application that takes me through a day in the life and the challenges that might arise along the way. I want to have fun in leu of the pandemic, I want to learn more about the pandemic, I want an element of escapism that makes light of the pandemic.</a:t>
             </a:r>
           </a:p>
           <a:p>
@@ -3623,7 +3624,7 @@
           <p:cNvPr id="2" name="Title 1">
             <a:extLst>
               <a:ext uri="{FF2B5EF4-FFF2-40B4-BE49-F238E27FC236}">
-                <a16:creationId xmlns:a16="http://schemas.microsoft.com/office/drawing/2014/main" id="{6586CEBD-F02D-4A67-9C75-5CCD30F84CE3}"/>
+                <a16:creationId xmlns:a16="http://schemas.microsoft.com/office/drawing/2014/main" id="{2C08BE83-FB20-44DC-8549-D5B5DA08C083}"/>
               </a:ext>
             </a:extLst>
           </p:cNvPr>
@@ -3641,7 +3642,7 @@
           <a:p>
             <a:r>
               <a:rPr lang="en-US" b="1" dirty="0"/>
-              <a:t>Motivation of Concept</a:t>
+              <a:t>Process</a:t>
             </a:r>
           </a:p>
         </p:txBody>
@@ -3651,7 +3652,7 @@
           <p:cNvPr id="3" name="Content Placeholder 2">
             <a:extLst>
               <a:ext uri="{FF2B5EF4-FFF2-40B4-BE49-F238E27FC236}">
-                <a16:creationId xmlns:a16="http://schemas.microsoft.com/office/drawing/2014/main" id="{D7CCC1CC-361E-461A-ABD9-183EB5A0714A}"/>
+                <a16:creationId xmlns:a16="http://schemas.microsoft.com/office/drawing/2014/main" id="{00D5584F-56F7-40D0-9DAF-BE8F89FD666E}"/>
               </a:ext>
             </a:extLst>
           </p:cNvPr>
@@ -3667,21 +3668,61 @@
           <a:bodyPr/>
           <a:lstStyle/>
           <a:p>
-            <a:pPr marL="0" indent="0">
-              <a:buNone/>
-            </a:pPr>
             <a:r>
               <a:rPr lang="en-US" dirty="0"/>
-              <a:t>As a group, we wanted to utilize the coding skills we have learned so far while both making and having as much fun as possible. The concept of a text based interactive game was largely inspired from the ‘Choose Your Own Adventure’ books and ‘Telltale Games.’</a:t>
-            </a:r>
-          </a:p>
-          <a:p>
-            <a:pPr marL="0" indent="0">
-              <a:buNone/>
-            </a:pPr>
+              <a:t>Technologies: JS, </a:t>
+            </a:r>
+            <a:r>
+              <a:rPr lang="en-US" dirty="0" err="1"/>
+              <a:t>Jquery</a:t>
+            </a:r>
             <a:r>
               <a:rPr lang="en-US" dirty="0"/>
-              <a:t>The concept of making the game about the 2020 pandemic was inspired by current circumstance </a:t>
+              <a:t>, </a:t>
+            </a:r>
+            <a:r>
+              <a:rPr lang="en-US" dirty="0" err="1"/>
+              <a:t>Bulma</a:t>
+            </a:r>
+            <a:r>
+              <a:rPr lang="en-US" dirty="0"/>
+              <a:t>, </a:t>
+            </a:r>
+            <a:r>
+              <a:rPr lang="en-US" dirty="0" err="1"/>
+              <a:t>evilInsult</a:t>
+            </a:r>
+            <a:r>
+              <a:rPr lang="en-US" dirty="0"/>
+              <a:t> API, </a:t>
+            </a:r>
+            <a:r>
+              <a:rPr lang="en-US" dirty="0" err="1"/>
+              <a:t>Giphy</a:t>
+            </a:r>
+            <a:r>
+              <a:rPr lang="en-US" dirty="0"/>
+              <a:t> API, Covid-19 API</a:t>
+            </a:r>
+          </a:p>
+          <a:p>
+            <a:r>
+              <a:rPr lang="en-US" dirty="0"/>
+              <a:t>Challenges: Merging code, functionality of APIs, time</a:t>
+            </a:r>
+          </a:p>
+          <a:p>
+            <a:r>
+              <a:rPr lang="en-US" dirty="0"/>
+              <a:t>Successes: figured out </a:t>
+            </a:r>
+            <a:r>
+              <a:rPr lang="en-US" dirty="0" err="1"/>
+              <a:t>Giphy</a:t>
+            </a:r>
+            <a:r>
+              <a:rPr lang="en-US" dirty="0"/>
+              <a:t> API, learning how to trim down with smaller functions, pushing and pulling GitHub.</a:t>
             </a:r>
           </a:p>
         </p:txBody>
@@ -3689,7 +3730,7 @@
     </p:spTree>
     <p:extLst>
       <p:ext uri="{BB962C8B-B14F-4D97-AF65-F5344CB8AC3E}">
-        <p14:creationId xmlns:p14="http://schemas.microsoft.com/office/powerpoint/2010/main" val="207363133"/>
+        <p14:creationId xmlns:p14="http://schemas.microsoft.com/office/powerpoint/2010/main" val="2666529011"/>
       </p:ext>
     </p:extLst>
   </p:cSld>
@@ -3721,7 +3762,7 @@
           <p:cNvPr id="2" name="Title 1">
             <a:extLst>
               <a:ext uri="{FF2B5EF4-FFF2-40B4-BE49-F238E27FC236}">
-                <a16:creationId xmlns:a16="http://schemas.microsoft.com/office/drawing/2014/main" id="{46E88649-E3B2-4B59-9E0E-79F7227B5ED6}"/>
+                <a16:creationId xmlns:a16="http://schemas.microsoft.com/office/drawing/2014/main" id="{6586CEBD-F02D-4A67-9C75-5CCD30F84CE3}"/>
               </a:ext>
             </a:extLst>
           </p:cNvPr>
@@ -3739,7 +3780,7 @@
           <a:p>
             <a:r>
               <a:rPr lang="en-US" b="1" dirty="0"/>
-              <a:t>Future Development</a:t>
+              <a:t>Motivation of Concept</a:t>
             </a:r>
           </a:p>
         </p:txBody>
@@ -3749,7 +3790,7 @@
           <p:cNvPr id="3" name="Content Placeholder 2">
             <a:extLst>
               <a:ext uri="{FF2B5EF4-FFF2-40B4-BE49-F238E27FC236}">
-                <a16:creationId xmlns:a16="http://schemas.microsoft.com/office/drawing/2014/main" id="{2BE78393-6136-4930-934D-7D54686CE1B4}"/>
+                <a16:creationId xmlns:a16="http://schemas.microsoft.com/office/drawing/2014/main" id="{D7CCC1CC-361E-461A-ABD9-183EB5A0714A}"/>
               </a:ext>
             </a:extLst>
           </p:cNvPr>
@@ -3765,80 +3806,29 @@
           <a:bodyPr/>
           <a:lstStyle/>
           <a:p>
-            <a:r>
-              <a:rPr lang="en-US" b="0" i="0" dirty="0">
-                <a:effectLst/>
-                <a:latin typeface="Slack-Lato"/>
-              </a:rPr>
-              <a:t>Would like to incorporate advance battle mechanics</a:t>
-            </a:r>
-          </a:p>
-          <a:p>
-            <a:r>
-              <a:rPr lang="en-US" dirty="0">
-                <a:latin typeface="Slack-Lato"/>
-              </a:rPr>
-              <a:t>A</a:t>
-            </a:r>
-            <a:r>
-              <a:rPr lang="en-US" b="0" i="0" dirty="0">
-                <a:effectLst/>
-                <a:latin typeface="Slack-Lato"/>
-              </a:rPr>
-              <a:t>n extended story</a:t>
-            </a:r>
-          </a:p>
-          <a:p>
-            <a:r>
-              <a:rPr lang="en-US" dirty="0">
-                <a:latin typeface="Slack-Lato"/>
-              </a:rPr>
-              <a:t>S</a:t>
-            </a:r>
-            <a:r>
-              <a:rPr lang="en-US" b="0" i="0" dirty="0">
-                <a:effectLst/>
-                <a:latin typeface="Slack-Lato"/>
-              </a:rPr>
-              <a:t>ound effects and music</a:t>
-            </a:r>
-          </a:p>
-          <a:p>
-            <a:r>
-              <a:rPr lang="en-US" b="0" i="0" dirty="0">
-                <a:effectLst/>
-                <a:latin typeface="Slack-Lato"/>
-              </a:rPr>
-              <a:t>Improved scoring</a:t>
-            </a:r>
-          </a:p>
-          <a:p>
-            <a:r>
-              <a:rPr lang="en-US" dirty="0">
-                <a:latin typeface="Slack-Lato"/>
-              </a:rPr>
-              <a:t>General style and </a:t>
-            </a:r>
-            <a:r>
-              <a:rPr lang="en-US">
-                <a:latin typeface="Slack-Lato"/>
-              </a:rPr>
-              <a:t>aesthetic changes</a:t>
-            </a:r>
-            <a:endParaRPr lang="en-US" b="0" i="0" dirty="0">
-              <a:effectLst/>
-              <a:latin typeface="Slack-Lato"/>
-            </a:endParaRPr>
-          </a:p>
-          <a:p>
-            <a:endParaRPr lang="en-US" dirty="0"/>
+            <a:pPr marL="0" indent="0">
+              <a:buNone/>
+            </a:pPr>
+            <a:r>
+              <a:rPr lang="en-US" dirty="0"/>
+              <a:t>As a group, we wanted to utilize the coding skills we have learned so far while both making and having as much fun as possible. The concept of a text based interactive game was largely inspired from the ‘Choose Your Own Adventure’ books and ‘Telltale Games.’</a:t>
+            </a:r>
+          </a:p>
+          <a:p>
+            <a:pPr marL="0" indent="0">
+              <a:buNone/>
+            </a:pPr>
+            <a:r>
+              <a:rPr lang="en-US" dirty="0"/>
+              <a:t>The concept of making the game about the 2020 pandemic was inspired by current circumstance </a:t>
+            </a:r>
           </a:p>
         </p:txBody>
       </p:sp>
     </p:spTree>
     <p:extLst>
       <p:ext uri="{BB962C8B-B14F-4D97-AF65-F5344CB8AC3E}">
-        <p14:creationId xmlns:p14="http://schemas.microsoft.com/office/powerpoint/2010/main" val="1104817776"/>
+        <p14:creationId xmlns:p14="http://schemas.microsoft.com/office/powerpoint/2010/main" val="207363133"/>
       </p:ext>
     </p:extLst>
   </p:cSld>
@@ -3870,6 +3860,149 @@
           <p:cNvPr id="2" name="Title 1">
             <a:extLst>
               <a:ext uri="{FF2B5EF4-FFF2-40B4-BE49-F238E27FC236}">
+                <a16:creationId xmlns:a16="http://schemas.microsoft.com/office/drawing/2014/main" id="{46E88649-E3B2-4B59-9E0E-79F7227B5ED6}"/>
+              </a:ext>
+            </a:extLst>
+          </p:cNvPr>
+          <p:cNvSpPr>
+            <a:spLocks noGrp="1"/>
+          </p:cNvSpPr>
+          <p:nvPr>
+            <p:ph type="title"/>
+          </p:nvPr>
+        </p:nvSpPr>
+        <p:spPr/>
+        <p:txBody>
+          <a:bodyPr/>
+          <a:lstStyle/>
+          <a:p>
+            <a:r>
+              <a:rPr lang="en-US" b="1" dirty="0"/>
+              <a:t>Future Development</a:t>
+            </a:r>
+          </a:p>
+        </p:txBody>
+      </p:sp>
+      <p:sp>
+        <p:nvSpPr>
+          <p:cNvPr id="3" name="Content Placeholder 2">
+            <a:extLst>
+              <a:ext uri="{FF2B5EF4-FFF2-40B4-BE49-F238E27FC236}">
+                <a16:creationId xmlns:a16="http://schemas.microsoft.com/office/drawing/2014/main" id="{2BE78393-6136-4930-934D-7D54686CE1B4}"/>
+              </a:ext>
+            </a:extLst>
+          </p:cNvPr>
+          <p:cNvSpPr>
+            <a:spLocks noGrp="1"/>
+          </p:cNvSpPr>
+          <p:nvPr>
+            <p:ph idx="1"/>
+          </p:nvPr>
+        </p:nvSpPr>
+        <p:spPr/>
+        <p:txBody>
+          <a:bodyPr/>
+          <a:lstStyle/>
+          <a:p>
+            <a:r>
+              <a:rPr lang="en-US" b="0" i="0" dirty="0">
+                <a:effectLst/>
+                <a:latin typeface="Slack-Lato"/>
+              </a:rPr>
+              <a:t>Would like to incorporate advance battle mechanics</a:t>
+            </a:r>
+          </a:p>
+          <a:p>
+            <a:r>
+              <a:rPr lang="en-US" dirty="0">
+                <a:latin typeface="Slack-Lato"/>
+              </a:rPr>
+              <a:t>A</a:t>
+            </a:r>
+            <a:r>
+              <a:rPr lang="en-US" b="0" i="0" dirty="0">
+                <a:effectLst/>
+                <a:latin typeface="Slack-Lato"/>
+              </a:rPr>
+              <a:t>n extended story</a:t>
+            </a:r>
+          </a:p>
+          <a:p>
+            <a:r>
+              <a:rPr lang="en-US" dirty="0">
+                <a:latin typeface="Slack-Lato"/>
+              </a:rPr>
+              <a:t>S</a:t>
+            </a:r>
+            <a:r>
+              <a:rPr lang="en-US" b="0" i="0" dirty="0">
+                <a:effectLst/>
+                <a:latin typeface="Slack-Lato"/>
+              </a:rPr>
+              <a:t>ound effects and music</a:t>
+            </a:r>
+          </a:p>
+          <a:p>
+            <a:r>
+              <a:rPr lang="en-US" b="0" i="0" dirty="0">
+                <a:effectLst/>
+                <a:latin typeface="Slack-Lato"/>
+              </a:rPr>
+              <a:t>Improved scoring</a:t>
+            </a:r>
+          </a:p>
+          <a:p>
+            <a:r>
+              <a:rPr lang="en-US" dirty="0">
+                <a:latin typeface="Slack-Lato"/>
+              </a:rPr>
+              <a:t>General style and aesthetic changes</a:t>
+            </a:r>
+            <a:endParaRPr lang="en-US" b="0" i="0" dirty="0">
+              <a:effectLst/>
+              <a:latin typeface="Slack-Lato"/>
+            </a:endParaRPr>
+          </a:p>
+          <a:p>
+            <a:endParaRPr lang="en-US" dirty="0"/>
+          </a:p>
+        </p:txBody>
+      </p:sp>
+    </p:spTree>
+    <p:extLst>
+      <p:ext uri="{BB962C8B-B14F-4D97-AF65-F5344CB8AC3E}">
+        <p14:creationId xmlns:p14="http://schemas.microsoft.com/office/powerpoint/2010/main" val="1104817776"/>
+      </p:ext>
+    </p:extLst>
+  </p:cSld>
+  <p:clrMapOvr>
+    <a:masterClrMapping/>
+  </p:clrMapOvr>
+</p:sld>
+</file>
+
+<file path=ppt/slides/slide7.xml><?xml version="1.0" encoding="utf-8"?>
+<p:sld xmlns:a="http://schemas.openxmlformats.org/drawingml/2006/main" xmlns:r="http://schemas.openxmlformats.org/officeDocument/2006/relationships" xmlns:p="http://schemas.openxmlformats.org/presentationml/2006/main">
+  <p:cSld>
+    <p:spTree>
+      <p:nvGrpSpPr>
+        <p:cNvPr id="1" name=""/>
+        <p:cNvGrpSpPr/>
+        <p:nvPr/>
+      </p:nvGrpSpPr>
+      <p:grpSpPr>
+        <a:xfrm>
+          <a:off x="0" y="0"/>
+          <a:ext cx="0" cy="0"/>
+          <a:chOff x="0" y="0"/>
+          <a:chExt cx="0" cy="0"/>
+        </a:xfrm>
+      </p:grpSpPr>
+      <p:sp>
+        <p:nvSpPr>
+          <p:cNvPr id="2" name="Title 1">
+            <a:extLst>
+              <a:ext uri="{FF2B5EF4-FFF2-40B4-BE49-F238E27FC236}">
                 <a16:creationId xmlns:a16="http://schemas.microsoft.com/office/drawing/2014/main" id="{AD6C86B3-56A5-41D0-A341-4719B5020017}"/>
               </a:ext>
             </a:extLst>
@@ -3919,7 +4052,7 @@
             </a:pPr>
             <a:r>
               <a:rPr lang="en-US" dirty="0"/>
-              <a:t>HTTPS: https://github.com/Mattmoe1/Survive-2020.git</a:t>
+              <a:t>Repo URL: https://github.com/Mattmoe1/Survive-2020.git</a:t>
             </a:r>
           </a:p>
           <a:p>
@@ -3942,6 +4075,10 @@
             <a:pPr marL="0" indent="0">
               <a:buNone/>
             </a:pPr>
+            <a:r>
+              <a:rPr lang="en-US"/>
+              <a:t>Website </a:t>
+            </a:r>
             <a:r>
               <a:rPr lang="en-US" dirty="0"/>
               <a:t>URL: </a:t>

</xml_diff>